<commit_message>
R codebasse skeleton v1
</commit_message>
<xml_diff>
--- a/ppt/Intro_TDA_ETF_Strategy_v4.pptx
+++ b/ppt/Intro_TDA_ETF_Strategy_v4.pptx
@@ -20,9 +20,9 @@
     <p:sldId id="261" r:id="rId8"/>
     <p:sldId id="262" r:id="rId9"/>
     <p:sldId id="263" r:id="rId10"/>
-    <p:sldId id="264" r:id="rId11"/>
-    <p:sldId id="266" r:id="rId12"/>
-    <p:sldId id="265" r:id="rId13"/>
+    <p:sldId id="302" r:id="rId11"/>
+    <p:sldId id="303" r:id="rId12"/>
+    <p:sldId id="304" r:id="rId13"/>
     <p:sldId id="268" r:id="rId14"/>
     <p:sldId id="273" r:id="rId15"/>
     <p:sldId id="271" r:id="rId16"/>
@@ -254,7 +254,7 @@
           <a:p>
             <a:fld id="{F0634884-F8E9-427C-AA30-105460B39161}" type="datetime1">
               <a:rPr lang="en-HK" smtClean="0"/>
-              <a:t>21/09/18</a:t>
+              <a:t>28/10/18</a:t>
             </a:fld>
             <a:endParaRPr lang="en-HK"/>
           </a:p>
@@ -432,7 +432,7 @@
           <a:p>
             <a:fld id="{F7FC2DED-D862-45B9-9A88-6F14FC83F15D}" type="datetime1">
               <a:rPr lang="en-HK" smtClean="0"/>
-              <a:t>21/09/18</a:t>
+              <a:t>28/10/18</a:t>
             </a:fld>
             <a:endParaRPr lang="en-HK"/>
           </a:p>
@@ -832,7 +832,7 @@
           <a:p>
             <a:fld id="{D8B7AC3B-2A58-41A4-B4BF-39C1EEE51686}" type="datetime1">
               <a:rPr lang="en-HK" smtClean="0"/>
-              <a:t>21/09/18</a:t>
+              <a:t>28/10/18</a:t>
             </a:fld>
             <a:endParaRPr lang="en-HK"/>
           </a:p>
@@ -1002,7 +1002,7 @@
           <a:p>
             <a:fld id="{CAD177D9-851D-495B-8906-540E926206EF}" type="datetime1">
               <a:rPr lang="en-HK" smtClean="0"/>
-              <a:t>21/09/18</a:t>
+              <a:t>28/10/18</a:t>
             </a:fld>
             <a:endParaRPr lang="en-HK"/>
           </a:p>
@@ -1182,7 +1182,7 @@
           <a:p>
             <a:fld id="{16B3676C-B5AE-432A-B5E9-C901F7D2A82E}" type="datetime1">
               <a:rPr lang="en-HK" smtClean="0"/>
-              <a:t>21/09/18</a:t>
+              <a:t>28/10/18</a:t>
             </a:fld>
             <a:endParaRPr lang="en-HK"/>
           </a:p>
@@ -1352,7 +1352,7 @@
           <a:p>
             <a:fld id="{3AD7EA58-AF20-47A2-963B-4912FB7787EC}" type="datetime1">
               <a:rPr lang="en-HK" smtClean="0"/>
-              <a:t>21/09/18</a:t>
+              <a:t>28/10/18</a:t>
             </a:fld>
             <a:endParaRPr lang="en-HK"/>
           </a:p>
@@ -1596,7 +1596,7 @@
           <a:p>
             <a:fld id="{BF61E52C-B4B7-48AA-8BB8-21E323CE1021}" type="datetime1">
               <a:rPr lang="en-HK" smtClean="0"/>
-              <a:t>21/09/18</a:t>
+              <a:t>28/10/18</a:t>
             </a:fld>
             <a:endParaRPr lang="en-HK"/>
           </a:p>
@@ -1828,7 +1828,7 @@
           <a:p>
             <a:fld id="{82064FDD-A9DD-439F-B623-C7ED1BFC05AA}" type="datetime1">
               <a:rPr lang="en-HK" smtClean="0"/>
-              <a:t>21/09/18</a:t>
+              <a:t>28/10/18</a:t>
             </a:fld>
             <a:endParaRPr lang="en-HK"/>
           </a:p>
@@ -2195,7 +2195,7 @@
           <a:p>
             <a:fld id="{FEADE791-B275-4E19-9A93-EBE3442A91B2}" type="datetime1">
               <a:rPr lang="en-HK" smtClean="0"/>
-              <a:t>21/09/18</a:t>
+              <a:t>28/10/18</a:t>
             </a:fld>
             <a:endParaRPr lang="en-HK"/>
           </a:p>
@@ -2313,7 +2313,7 @@
           <a:p>
             <a:fld id="{61E0E81C-001B-4AA5-AB11-957D81CB3816}" type="datetime1">
               <a:rPr lang="en-HK" smtClean="0"/>
-              <a:t>21/09/18</a:t>
+              <a:t>28/10/18</a:t>
             </a:fld>
             <a:endParaRPr lang="en-HK"/>
           </a:p>
@@ -2408,7 +2408,7 @@
           <a:p>
             <a:fld id="{B3B71F2B-2683-4DF7-BDF2-4ACFC2E1E9F5}" type="datetime1">
               <a:rPr lang="en-HK" smtClean="0"/>
-              <a:t>21/09/18</a:t>
+              <a:t>28/10/18</a:t>
             </a:fld>
             <a:endParaRPr lang="en-HK"/>
           </a:p>
@@ -2685,7 +2685,7 @@
           <a:p>
             <a:fld id="{CCDEE589-A321-43D7-83A0-DB5FA9E22277}" type="datetime1">
               <a:rPr lang="en-HK" smtClean="0"/>
-              <a:t>21/09/18</a:t>
+              <a:t>28/10/18</a:t>
             </a:fld>
             <a:endParaRPr lang="en-HK"/>
           </a:p>
@@ -2942,7 +2942,7 @@
           <a:p>
             <a:fld id="{4A9B494D-CB21-49A5-AAF4-4F1F8FEE0272}" type="datetime1">
               <a:rPr lang="en-HK" smtClean="0"/>
-              <a:t>21/09/18</a:t>
+              <a:t>28/10/18</a:t>
             </a:fld>
             <a:endParaRPr lang="en-HK"/>
           </a:p>
@@ -3155,7 +3155,7 @@
           <a:p>
             <a:fld id="{C16470B1-D3BC-464C-8F79-83614817CD2D}" type="datetime1">
               <a:rPr lang="en-HK" smtClean="0"/>
-              <a:t>21/09/18</a:t>
+              <a:t>28/10/18</a:t>
             </a:fld>
             <a:endParaRPr lang="en-HK"/>
           </a:p>
@@ -3813,7 +3813,7 @@
     </p:spTree>
     <p:extLst>
       <p:ext uri="{BB962C8B-B14F-4D97-AF65-F5344CB8AC3E}">
-        <p14:creationId xmlns:p14="http://schemas.microsoft.com/office/powerpoint/2010/main" val="4159783819"/>
+        <p14:creationId xmlns:p14="http://schemas.microsoft.com/office/powerpoint/2010/main" val="1218072462"/>
       </p:ext>
     </p:extLst>
   </p:cSld>
@@ -3996,7 +3996,7 @@
     </p:spTree>
     <p:extLst>
       <p:ext uri="{BB962C8B-B14F-4D97-AF65-F5344CB8AC3E}">
-        <p14:creationId xmlns:p14="http://schemas.microsoft.com/office/powerpoint/2010/main" val="669326930"/>
+        <p14:creationId xmlns:p14="http://schemas.microsoft.com/office/powerpoint/2010/main" val="1237578722"/>
       </p:ext>
     </p:extLst>
   </p:cSld>
@@ -4179,7 +4179,7 @@
     </p:spTree>
     <p:extLst>
       <p:ext uri="{BB962C8B-B14F-4D97-AF65-F5344CB8AC3E}">
-        <p14:creationId xmlns:p14="http://schemas.microsoft.com/office/powerpoint/2010/main" val="2563806220"/>
+        <p14:creationId xmlns:p14="http://schemas.microsoft.com/office/powerpoint/2010/main" val="3250119747"/>
       </p:ext>
     </p:extLst>
   </p:cSld>
@@ -11188,6 +11188,13 @@
   <p:clrMapOvr>
     <a:masterClrMapping/>
   </p:clrMapOvr>
+  <p:timing>
+    <p:tnLst>
+      <p:par>
+        <p:cTn xmlns:p14="http://schemas.microsoft.com/office/powerpoint/2010/main" id="1" dur="indefinite" restart="never" nodeType="tmRoot"/>
+      </p:par>
+    </p:tnLst>
+  </p:timing>
 </p:sld>
 </file>
 
@@ -11817,6 +11824,13 @@
   <p:clrMapOvr>
     <a:masterClrMapping/>
   </p:clrMapOvr>
+  <p:timing>
+    <p:tnLst>
+      <p:par>
+        <p:cTn xmlns:p14="http://schemas.microsoft.com/office/powerpoint/2010/main" id="1" dur="indefinite" restart="never" nodeType="tmRoot"/>
+      </p:par>
+    </p:tnLst>
+  </p:timing>
 </p:sld>
 </file>
 
@@ -11913,6 +11927,13 @@
   <p:clrMapOvr>
     <a:masterClrMapping/>
   </p:clrMapOvr>
+  <p:timing>
+    <p:tnLst>
+      <p:par>
+        <p:cTn xmlns:p14="http://schemas.microsoft.com/office/powerpoint/2010/main" id="1" dur="indefinite" restart="never" nodeType="tmRoot"/>
+      </p:par>
+    </p:tnLst>
+  </p:timing>
 </p:sld>
 </file>
 
@@ -12013,9 +12034,16 @@
             <a:endParaRPr lang="en-US" dirty="0"/>
           </a:p>
           <a:p>
+            <a:endParaRPr lang="en-US" dirty="0" smtClean="0"/>
+          </a:p>
+          <a:p>
+            <a:r>
+              <a:rPr lang="en-US" dirty="0" smtClean="0"/>
+              <a:t>These </a:t>
+            </a:r>
             <a:r>
               <a:rPr lang="en-US" dirty="0"/>
-              <a:t>These periodic signals are hard for traditional algorithms and factors (features in the machine learning world) to capture</a:t>
+              <a:t>periodic signals are hard for traditional algorithms and factors (features in the machine learning world) to capture</a:t>
             </a:r>
           </a:p>
           <a:p>
@@ -12031,7 +12059,7 @@
       </p:sp>
       <p:pic>
         <p:nvPicPr>
-          <p:cNvPr id="4" name="Picture 3" descr="Screen Shot 2018-05-12 at 18.40.53.png">
+          <p:cNvPr id="5" name="Picture 4" descr="Screen Shot 2018-05-12 at 18.40.53.png">
             <a:extLst>
               <a:ext uri="{FF2B5EF4-FFF2-40B4-BE49-F238E27FC236}">
                 <a16:creationId xmlns:a16="http://schemas.microsoft.com/office/drawing/2014/main" xmlns="" id="{6F77B5D6-BA39-4465-81BD-1BE4F0824339}"/>

</xml_diff>